<commit_message>
Odradjene izmene na prezentaciji.
</commit_message>
<xml_diff>
--- a/PLATO.pptx
+++ b/PLATO.pptx
@@ -5,10 +5,10 @@
     <p:sldMasterId id="2147483648" r:id="rId1"/>
   </p:sldMasterIdLst>
   <p:notesMasterIdLst>
-    <p:notesMasterId r:id="rId13"/>
+    <p:notesMasterId r:id="rId14"/>
   </p:notesMasterIdLst>
   <p:handoutMasterIdLst>
-    <p:handoutMasterId r:id="rId14"/>
+    <p:handoutMasterId r:id="rId15"/>
   </p:handoutMasterIdLst>
   <p:sldIdLst>
     <p:sldId id="256" r:id="rId2"/>
@@ -19,9 +19,10 @@
     <p:sldId id="262" r:id="rId7"/>
     <p:sldId id="263" r:id="rId8"/>
     <p:sldId id="258" r:id="rId9"/>
-    <p:sldId id="260" r:id="rId10"/>
-    <p:sldId id="264" r:id="rId11"/>
-    <p:sldId id="267" r:id="rId12"/>
+    <p:sldId id="268" r:id="rId10"/>
+    <p:sldId id="260" r:id="rId11"/>
+    <p:sldId id="264" r:id="rId12"/>
+    <p:sldId id="267" r:id="rId13"/>
   </p:sldIdLst>
   <p:sldSz cx="9144000" cy="6858000" type="screen4x3"/>
   <p:notesSz cx="6858000" cy="9144000"/>
@@ -209,7 +210,7 @@
           <a:p>
             <a:fld id="{98CA5DC2-BFE8-4A8C-8021-357279966D7E}" type="datetimeFigureOut">
               <a:rPr lang="sr-Latn-RS" smtClean="0"/>
-              <a:t>14.12.2015</a:t>
+              <a:t>15.12.2015</a:t>
             </a:fld>
             <a:endParaRPr lang="sr-Latn-RS"/>
           </a:p>
@@ -379,7 +380,7 @@
           <a:p>
             <a:fld id="{64D71C56-F4DC-412A-A8CD-FD6C96B3F12E}" type="datetimeFigureOut">
               <a:rPr lang="sr-Latn-RS" smtClean="0"/>
-              <a:t>14.12.2015</a:t>
+              <a:t>15.12.2015</a:t>
             </a:fld>
             <a:endParaRPr lang="sr-Latn-RS"/>
           </a:p>
@@ -997,7 +998,7 @@
           <a:p>
             <a:fld id="{023B7FC6-FCB6-482F-855C-A8D908793F29}" type="datetime1">
               <a:rPr lang="sr-Latn-RS" smtClean="0"/>
-              <a:t>14.12.2015</a:t>
+              <a:t>15.12.2015</a:t>
             </a:fld>
             <a:endParaRPr lang="sr-Latn-RS"/>
           </a:p>
@@ -1179,7 +1180,7 @@
           <a:p>
             <a:fld id="{50D68971-57F9-4DA8-8818-2CB81EE659E7}" type="datetime1">
               <a:rPr lang="sr-Latn-RS" smtClean="0"/>
-              <a:t>14.12.2015</a:t>
+              <a:t>15.12.2015</a:t>
             </a:fld>
             <a:endParaRPr lang="sr-Latn-RS"/>
           </a:p>
@@ -1371,7 +1372,7 @@
           <a:p>
             <a:fld id="{B886F984-AF34-4ABE-946D-48C4227BDAF7}" type="datetime1">
               <a:rPr lang="sr-Latn-RS" smtClean="0"/>
-              <a:t>14.12.2015</a:t>
+              <a:t>15.12.2015</a:t>
             </a:fld>
             <a:endParaRPr lang="sr-Latn-RS"/>
           </a:p>
@@ -1553,7 +1554,7 @@
           <a:p>
             <a:fld id="{C1E2EA92-73A6-40F3-B4BD-C553E6047F19}" type="datetime1">
               <a:rPr lang="sr-Latn-RS" smtClean="0"/>
-              <a:t>14.12.2015</a:t>
+              <a:t>15.12.2015</a:t>
             </a:fld>
             <a:endParaRPr lang="sr-Latn-RS"/>
           </a:p>
@@ -1811,7 +1812,7 @@
           <a:p>
             <a:fld id="{7DD041AA-7375-49F2-B8EC-D4D59716C7FE}" type="datetime1">
               <a:rPr lang="sr-Latn-RS" smtClean="0"/>
-              <a:t>14.12.2015</a:t>
+              <a:t>15.12.2015</a:t>
             </a:fld>
             <a:endParaRPr lang="sr-Latn-RS"/>
           </a:p>
@@ -2111,7 +2112,7 @@
           <a:p>
             <a:fld id="{B165CBFE-CEEF-482B-BF99-CB91C4539A8C}" type="datetime1">
               <a:rPr lang="sr-Latn-RS" smtClean="0"/>
-              <a:t>14.12.2015</a:t>
+              <a:t>15.12.2015</a:t>
             </a:fld>
             <a:endParaRPr lang="sr-Latn-RS"/>
           </a:p>
@@ -2545,7 +2546,7 @@
           <a:p>
             <a:fld id="{8E176CDC-F7EE-4876-B9D0-D463BCC88E4F}" type="datetime1">
               <a:rPr lang="sr-Latn-RS" smtClean="0"/>
-              <a:t>14.12.2015</a:t>
+              <a:t>15.12.2015</a:t>
             </a:fld>
             <a:endParaRPr lang="sr-Latn-RS"/>
           </a:p>
@@ -2675,7 +2676,7 @@
           <a:p>
             <a:fld id="{E93049A8-ACFB-4358-A016-EAE0A9EFBA7F}" type="datetime1">
               <a:rPr lang="sr-Latn-RS" smtClean="0"/>
-              <a:t>14.12.2015</a:t>
+              <a:t>15.12.2015</a:t>
             </a:fld>
             <a:endParaRPr lang="sr-Latn-RS"/>
           </a:p>
@@ -2782,7 +2783,7 @@
           <a:p>
             <a:fld id="{0E227DE8-0079-4F70-A113-8512494CAD50}" type="datetime1">
               <a:rPr lang="sr-Latn-RS" smtClean="0"/>
-              <a:t>14.12.2015</a:t>
+              <a:t>15.12.2015</a:t>
             </a:fld>
             <a:endParaRPr lang="sr-Latn-RS"/>
           </a:p>
@@ -3071,7 +3072,7 @@
           <a:p>
             <a:fld id="{A6FD11DE-1406-42DA-9199-CD54BC24C261}" type="datetime1">
               <a:rPr lang="sr-Latn-RS" smtClean="0"/>
-              <a:t>14.12.2015</a:t>
+              <a:t>15.12.2015</a:t>
             </a:fld>
             <a:endParaRPr lang="sr-Latn-RS"/>
           </a:p>
@@ -3336,7 +3337,7 @@
           <a:p>
             <a:fld id="{0E5220A4-B845-41B1-815C-1AC17E4F5BD4}" type="datetime1">
               <a:rPr lang="sr-Latn-RS" smtClean="0"/>
-              <a:t>14.12.2015</a:t>
+              <a:t>15.12.2015</a:t>
             </a:fld>
             <a:endParaRPr lang="sr-Latn-RS"/>
           </a:p>
@@ -3561,7 +3562,7 @@
           <a:p>
             <a:fld id="{1CFFA808-3629-4987-8FF9-AB2367982019}" type="datetime1">
               <a:rPr lang="sr-Latn-RS" smtClean="0"/>
-              <a:t>14.12.2015</a:t>
+              <a:t>15.12.2015</a:t>
             </a:fld>
             <a:endParaRPr lang="sr-Latn-RS"/>
           </a:p>
@@ -4443,7 +4444,7 @@
           <a:lstStyle/>
           <a:p>
             <a:r>
-              <a:rPr lang="sr-Latn-RS" b="1" dirty="0">
+              <a:rPr lang="sr-Latn-RS" b="1" dirty="0" smtClean="0">
                 <a:solidFill>
                   <a:srgbClr val="C00000"/>
                 </a:solidFill>
@@ -4456,35 +4457,54 @@
           </a:p>
         </p:txBody>
       </p:sp>
-      <p:pic>
-        <p:nvPicPr>
-          <p:cNvPr id="6" name="Content Placeholder 5"/>
-          <p:cNvPicPr>
-            <a:picLocks noGrp="1" noChangeAspect="1"/>
-          </p:cNvPicPr>
+      <p:sp>
+        <p:nvSpPr>
+          <p:cNvPr id="3" name="Content Placeholder 2"/>
+          <p:cNvSpPr>
+            <a:spLocks noGrp="1"/>
+          </p:cNvSpPr>
           <p:nvPr>
             <p:ph idx="1"/>
           </p:nvPr>
-        </p:nvPicPr>
-        <p:blipFill>
-          <a:blip r:embed="rId2">
-            <a:extLst>
-              <a:ext uri="{28A0092B-C50C-407E-A947-70E740481C1C}">
-                <a14:useLocalDpi xmlns:a14="http://schemas.microsoft.com/office/drawing/2010/main" val="0"/>
-              </a:ext>
-            </a:extLst>
-          </a:blip>
-          <a:stretch>
-            <a:fillRect/>
-          </a:stretch>
-        </p:blipFill>
+        </p:nvSpPr>
         <p:spPr>
           <a:xfrm>
-            <a:off x="1337342" y="1340768"/>
-            <a:ext cx="6469315" cy="4320481"/>
+            <a:off x="446856" y="1628800"/>
+            <a:ext cx="8229600" cy="4525963"/>
           </a:xfrm>
         </p:spPr>
-      </p:pic>
+        <p:txBody>
+          <a:bodyPr>
+            <a:noAutofit/>
+          </a:bodyPr>
+          <a:lstStyle/>
+          <a:p>
+            <a:pPr marL="0" indent="0">
+              <a:buNone/>
+            </a:pPr>
+            <a:endParaRPr lang="sr-Latn-RS" sz="2200" dirty="0" smtClean="0">
+              <a:latin typeface="Times New Roman" panose="02020603050405020304" pitchFamily="18" charset="0"/>
+              <a:cs typeface="Times New Roman" panose="02020603050405020304" pitchFamily="18" charset="0"/>
+            </a:endParaRPr>
+          </a:p>
+          <a:p>
+            <a:pPr marL="0" indent="0">
+              <a:buNone/>
+            </a:pPr>
+            <a:r>
+              <a:rPr lang="sr-Latn-RS" sz="2200" dirty="0">
+                <a:latin typeface="Times New Roman" panose="02020603050405020304" pitchFamily="18" charset="0"/>
+                <a:cs typeface="Times New Roman" panose="02020603050405020304" pitchFamily="18" charset="0"/>
+              </a:rPr>
+              <a:t>	</a:t>
+            </a:r>
+            <a:endParaRPr lang="sr-Latn-RS" sz="2200" dirty="0" smtClean="0">
+              <a:latin typeface="Times New Roman" panose="02020603050405020304" pitchFamily="18" charset="0"/>
+              <a:cs typeface="Times New Roman" panose="02020603050405020304" pitchFamily="18" charset="0"/>
+            </a:endParaRPr>
+          </a:p>
+        </p:txBody>
+      </p:sp>
       <p:sp>
         <p:nvSpPr>
           <p:cNvPr id="4" name="Slide Number Placeholder 3"/>
@@ -4543,16 +4563,46 @@
           </a:p>
         </p:txBody>
       </p:sp>
-      <p:sp>
-        <p:nvSpPr>
-          <p:cNvPr id="8" name="TextBox 7"/>
+      <p:pic>
+        <p:nvPicPr>
+          <p:cNvPr id="6" name="Picture 5"/>
+          <p:cNvPicPr>
+            <a:picLocks noChangeAspect="1"/>
+          </p:cNvPicPr>
+          <p:nvPr/>
+        </p:nvPicPr>
+        <p:blipFill>
+          <a:blip r:embed="rId2">
+            <a:extLst>
+              <a:ext uri="{28A0092B-C50C-407E-A947-70E740481C1C}">
+                <a14:useLocalDpi xmlns:a14="http://schemas.microsoft.com/office/drawing/2010/main" val="0"/>
+              </a:ext>
+            </a:extLst>
+          </a:blip>
+          <a:stretch>
+            <a:fillRect/>
+          </a:stretch>
+        </p:blipFill>
+        <p:spPr>
+          <a:xfrm>
+            <a:off x="3059832" y="1447628"/>
+            <a:ext cx="2907800" cy="2907800"/>
+          </a:xfrm>
+          <a:prstGeom prst="rect">
+            <a:avLst/>
+          </a:prstGeom>
+        </p:spPr>
+      </p:pic>
+      <p:sp>
+        <p:nvSpPr>
+          <p:cNvPr id="7" name="TextBox 6"/>
           <p:cNvSpPr txBox="1"/>
           <p:nvPr/>
         </p:nvSpPr>
         <p:spPr>
           <a:xfrm>
-            <a:off x="1871700" y="5733256"/>
-            <a:ext cx="5400600" cy="369332"/>
+            <a:off x="465865" y="4507754"/>
+            <a:ext cx="8208912" cy="369332"/>
           </a:xfrm>
           <a:prstGeom prst="rect">
             <a:avLst/>
@@ -4567,44 +4617,27 @@
           <a:p>
             <a:pPr algn="ctr"/>
             <a:r>
+              <a:rPr lang="sr-Latn-RS" dirty="0">
+                <a:latin typeface="Times New Roman" panose="02020603050405020304" pitchFamily="18" charset="0"/>
+                <a:cs typeface="Times New Roman" panose="02020603050405020304" pitchFamily="18" charset="0"/>
+              </a:rPr>
+              <a:t> </a:t>
+            </a:r>
+            <a:r>
               <a:rPr lang="sr-Latn-RS" dirty="0" smtClean="0">
                 <a:latin typeface="Times New Roman" panose="02020603050405020304" pitchFamily="18" charset="0"/>
                 <a:cs typeface="Times New Roman" panose="02020603050405020304" pitchFamily="18" charset="0"/>
               </a:rPr>
-              <a:t>Primer</a:t>
-            </a:r>
-            <a:r>
-              <a:rPr lang="en-US" dirty="0" smtClean="0">
-                <a:latin typeface="Times New Roman" panose="02020603050405020304" pitchFamily="18" charset="0"/>
-                <a:cs typeface="Times New Roman" panose="02020603050405020304" pitchFamily="18" charset="0"/>
-              </a:rPr>
-              <a:t> </a:t>
-            </a:r>
-            <a:r>
-              <a:rPr lang="en-US" dirty="0" err="1" smtClean="0">
-                <a:latin typeface="Times New Roman" panose="02020603050405020304" pitchFamily="18" charset="0"/>
-                <a:cs typeface="Times New Roman" panose="02020603050405020304" pitchFamily="18" charset="0"/>
-              </a:rPr>
-              <a:t>mogu</a:t>
-            </a:r>
-            <a:r>
-              <a:rPr lang="sr-Latn-RS" dirty="0" smtClean="0">
-                <a:latin typeface="Times New Roman" panose="02020603050405020304" pitchFamily="18" charset="0"/>
-                <a:cs typeface="Times New Roman" panose="02020603050405020304" pitchFamily="18" charset="0"/>
-              </a:rPr>
-              <a:t>ćeg izgleda aplikacije</a:t>
-            </a:r>
-            <a:endParaRPr lang="sr-Latn-RS" dirty="0">
-              <a:latin typeface="Times New Roman" panose="02020603050405020304" pitchFamily="18" charset="0"/>
-              <a:cs typeface="Times New Roman" panose="02020603050405020304" pitchFamily="18" charset="0"/>
-            </a:endParaRPr>
+              <a:t>     Primer toka obrade slike i obuhvatanje samo bitnih podataka.</a:t>
+            </a:r>
+            <a:endParaRPr lang="sr-Latn-RS" dirty="0"/>
           </a:p>
         </p:txBody>
       </p:sp>
     </p:spTree>
     <p:extLst>
       <p:ext uri="{BB962C8B-B14F-4D97-AF65-F5344CB8AC3E}">
-        <p14:creationId xmlns:p14="http://schemas.microsoft.com/office/powerpoint/2010/main" val="3128070497"/>
+        <p14:creationId xmlns:p14="http://schemas.microsoft.com/office/powerpoint/2010/main" val="4103685092"/>
       </p:ext>
     </p:extLst>
   </p:cSld>
@@ -4679,74 +4712,35 @@
           </a:p>
         </p:txBody>
       </p:sp>
-      <p:sp>
-        <p:nvSpPr>
-          <p:cNvPr id="3" name="Content Placeholder 2"/>
-          <p:cNvSpPr>
-            <a:spLocks noGrp="1"/>
-          </p:cNvSpPr>
+      <p:pic>
+        <p:nvPicPr>
+          <p:cNvPr id="6" name="Content Placeholder 5"/>
+          <p:cNvPicPr>
+            <a:picLocks noGrp="1" noChangeAspect="1"/>
+          </p:cNvPicPr>
           <p:nvPr>
             <p:ph idx="1"/>
           </p:nvPr>
-        </p:nvSpPr>
-        <p:spPr/>
-        <p:txBody>
-          <a:bodyPr/>
-          <a:lstStyle/>
-          <a:p>
-            <a:pPr marL="0" indent="0">
-              <a:buNone/>
-            </a:pPr>
-            <a:r>
-              <a:rPr lang="en-US" b="1" u="sng" dirty="0" err="1" smtClean="0">
-                <a:latin typeface="Times New Roman" panose="02020603050405020304" pitchFamily="18" charset="0"/>
-                <a:cs typeface="Times New Roman" panose="02020603050405020304" pitchFamily="18" charset="0"/>
-              </a:rPr>
-              <a:t>Informacije</a:t>
-            </a:r>
-            <a:r>
-              <a:rPr lang="en-US" b="1" u="sng" dirty="0" smtClean="0">
-                <a:latin typeface="Times New Roman" panose="02020603050405020304" pitchFamily="18" charset="0"/>
-                <a:cs typeface="Times New Roman" panose="02020603050405020304" pitchFamily="18" charset="0"/>
-              </a:rPr>
-              <a:t>:</a:t>
-            </a:r>
-          </a:p>
-          <a:p>
-            <a:pPr marL="0" indent="0">
-              <a:buNone/>
-            </a:pPr>
-            <a:endParaRPr lang="en-US" dirty="0"/>
-          </a:p>
-          <a:p>
-            <a:pPr marL="0" indent="0">
-              <a:buNone/>
-            </a:pPr>
-            <a:r>
-              <a:rPr lang="en-US" dirty="0"/>
-              <a:t> </a:t>
-            </a:r>
-            <a:r>
-              <a:rPr lang="en-US" dirty="0" smtClean="0"/>
-              <a:t>    </a:t>
-            </a:r>
-            <a:r>
-              <a:rPr lang="sr-Latn-RS" sz="2800" dirty="0" smtClean="0">
-                <a:latin typeface="Times New Roman" panose="02020603050405020304" pitchFamily="18" charset="0"/>
-                <a:cs typeface="Times New Roman" panose="02020603050405020304" pitchFamily="18" charset="0"/>
-              </a:rPr>
-              <a:t>https</a:t>
-            </a:r>
-            <a:r>
-              <a:rPr lang="sr-Latn-RS" sz="2800" dirty="0">
-                <a:latin typeface="Times New Roman" panose="02020603050405020304" pitchFamily="18" charset="0"/>
-                <a:cs typeface="Times New Roman" panose="02020603050405020304" pitchFamily="18" charset="0"/>
-              </a:rPr>
-              <a:t>://github.com/DejanUrosevic/SoftProjekat.git</a:t>
-            </a:r>
-          </a:p>
-        </p:txBody>
-      </p:sp>
+        </p:nvPicPr>
+        <p:blipFill>
+          <a:blip r:embed="rId2">
+            <a:extLst>
+              <a:ext uri="{28A0092B-C50C-407E-A947-70E740481C1C}">
+                <a14:useLocalDpi xmlns:a14="http://schemas.microsoft.com/office/drawing/2010/main" val="0"/>
+              </a:ext>
+            </a:extLst>
+          </a:blip>
+          <a:stretch>
+            <a:fillRect/>
+          </a:stretch>
+        </p:blipFill>
+        <p:spPr>
+          <a:xfrm>
+            <a:off x="1337342" y="1340768"/>
+            <a:ext cx="6469315" cy="4320481"/>
+          </a:xfrm>
+        </p:spPr>
+      </p:pic>
       <p:sp>
         <p:nvSpPr>
           <p:cNvPr id="4" name="Slide Number Placeholder 3"/>
@@ -4765,6 +4759,268 @@
             <a:fld id="{136482DD-122F-45A2-B630-FA3C16873A18}" type="slidenum">
               <a:rPr lang="sr-Latn-RS" smtClean="0"/>
               <a:t>11</a:t>
+            </a:fld>
+            <a:endParaRPr lang="sr-Latn-RS"/>
+          </a:p>
+        </p:txBody>
+      </p:sp>
+      <p:sp>
+        <p:nvSpPr>
+          <p:cNvPr id="5" name="Line 6"/>
+          <p:cNvSpPr>
+            <a:spLocks noChangeShapeType="1"/>
+          </p:cNvSpPr>
+          <p:nvPr/>
+        </p:nvSpPr>
+        <p:spPr bwMode="auto">
+          <a:xfrm>
+            <a:off x="467544" y="1196752"/>
+            <a:ext cx="8208912" cy="0"/>
+          </a:xfrm>
+          <a:prstGeom prst="line">
+            <a:avLst/>
+          </a:prstGeom>
+          <a:noFill/>
+          <a:ln w="9525">
+            <a:solidFill>
+              <a:schemeClr val="tx1"/>
+            </a:solidFill>
+            <a:round/>
+            <a:headEnd/>
+            <a:tailEnd/>
+          </a:ln>
+        </p:spPr>
+        <p:txBody>
+          <a:bodyPr/>
+          <a:lstStyle/>
+          <a:p>
+            <a:pPr algn="just"/>
+            <a:endParaRPr lang="en-US" dirty="0"/>
+          </a:p>
+        </p:txBody>
+      </p:sp>
+      <p:sp>
+        <p:nvSpPr>
+          <p:cNvPr id="8" name="TextBox 7"/>
+          <p:cNvSpPr txBox="1"/>
+          <p:nvPr/>
+        </p:nvSpPr>
+        <p:spPr>
+          <a:xfrm>
+            <a:off x="1871700" y="5733256"/>
+            <a:ext cx="5400600" cy="369332"/>
+          </a:xfrm>
+          <a:prstGeom prst="rect">
+            <a:avLst/>
+          </a:prstGeom>
+          <a:noFill/>
+        </p:spPr>
+        <p:txBody>
+          <a:bodyPr wrap="square" rtlCol="0">
+            <a:spAutoFit/>
+          </a:bodyPr>
+          <a:lstStyle/>
+          <a:p>
+            <a:pPr algn="ctr"/>
+            <a:r>
+              <a:rPr lang="sr-Latn-RS" dirty="0" smtClean="0">
+                <a:latin typeface="Times New Roman" panose="02020603050405020304" pitchFamily="18" charset="0"/>
+                <a:cs typeface="Times New Roman" panose="02020603050405020304" pitchFamily="18" charset="0"/>
+              </a:rPr>
+              <a:t>Primer</a:t>
+            </a:r>
+            <a:r>
+              <a:rPr lang="en-US" dirty="0" smtClean="0">
+                <a:latin typeface="Times New Roman" panose="02020603050405020304" pitchFamily="18" charset="0"/>
+                <a:cs typeface="Times New Roman" panose="02020603050405020304" pitchFamily="18" charset="0"/>
+              </a:rPr>
+              <a:t> </a:t>
+            </a:r>
+            <a:r>
+              <a:rPr lang="en-US" dirty="0" err="1" smtClean="0">
+                <a:latin typeface="Times New Roman" panose="02020603050405020304" pitchFamily="18" charset="0"/>
+                <a:cs typeface="Times New Roman" panose="02020603050405020304" pitchFamily="18" charset="0"/>
+              </a:rPr>
+              <a:t>mogu</a:t>
+            </a:r>
+            <a:r>
+              <a:rPr lang="sr-Latn-RS" dirty="0" smtClean="0">
+                <a:latin typeface="Times New Roman" panose="02020603050405020304" pitchFamily="18" charset="0"/>
+                <a:cs typeface="Times New Roman" panose="02020603050405020304" pitchFamily="18" charset="0"/>
+              </a:rPr>
+              <a:t>ćeg izgleda aplikacije</a:t>
+            </a:r>
+            <a:endParaRPr lang="sr-Latn-RS" dirty="0">
+              <a:latin typeface="Times New Roman" panose="02020603050405020304" pitchFamily="18" charset="0"/>
+              <a:cs typeface="Times New Roman" panose="02020603050405020304" pitchFamily="18" charset="0"/>
+            </a:endParaRPr>
+          </a:p>
+        </p:txBody>
+      </p:sp>
+    </p:spTree>
+    <p:extLst>
+      <p:ext uri="{BB962C8B-B14F-4D97-AF65-F5344CB8AC3E}">
+        <p14:creationId xmlns:p14="http://schemas.microsoft.com/office/powerpoint/2010/main" val="3128070497"/>
+      </p:ext>
+    </p:extLst>
+  </p:cSld>
+  <p:clrMapOvr>
+    <a:masterClrMapping/>
+  </p:clrMapOvr>
+  <mc:AlternateContent xmlns:mc="http://schemas.openxmlformats.org/markup-compatibility/2006" xmlns:p14="http://schemas.microsoft.com/office/powerpoint/2010/main">
+    <mc:Choice Requires="p14">
+      <p:transition spd="med">
+        <p14:reveal/>
+      </p:transition>
+    </mc:Choice>
+    <mc:Fallback xmlns="">
+      <p:transition spd="med">
+        <p:fade/>
+      </p:transition>
+    </mc:Fallback>
+  </mc:AlternateContent>
+  <p:timing>
+    <p:tnLst>
+      <p:par>
+        <p:cTn id="1" dur="indefinite" restart="never" nodeType="tmRoot"/>
+      </p:par>
+    </p:tnLst>
+  </p:timing>
+</p:sld>
+</file>
+
+<file path=ppt/slides/slide12.xml><?xml version="1.0" encoding="utf-8"?>
+<p:sld xmlns:a="http://schemas.openxmlformats.org/drawingml/2006/main" xmlns:r="http://schemas.openxmlformats.org/officeDocument/2006/relationships" xmlns:p="http://schemas.openxmlformats.org/presentationml/2006/main">
+  <p:cSld>
+    <p:spTree>
+      <p:nvGrpSpPr>
+        <p:cNvPr id="1" name=""/>
+        <p:cNvGrpSpPr/>
+        <p:nvPr/>
+      </p:nvGrpSpPr>
+      <p:grpSpPr>
+        <a:xfrm>
+          <a:off x="0" y="0"/>
+          <a:ext cx="0" cy="0"/>
+          <a:chOff x="0" y="0"/>
+          <a:chExt cx="0" cy="0"/>
+        </a:xfrm>
+      </p:grpSpPr>
+      <p:sp>
+        <p:nvSpPr>
+          <p:cNvPr id="2" name="Title 1"/>
+          <p:cNvSpPr>
+            <a:spLocks noGrp="1"/>
+          </p:cNvSpPr>
+          <p:nvPr>
+            <p:ph type="title"/>
+          </p:nvPr>
+        </p:nvSpPr>
+        <p:spPr/>
+        <p:txBody>
+          <a:bodyPr/>
+          <a:lstStyle/>
+          <a:p>
+            <a:r>
+              <a:rPr lang="sr-Latn-RS" b="1" dirty="0">
+                <a:solidFill>
+                  <a:srgbClr val="C00000"/>
+                </a:solidFill>
+                <a:latin typeface="Times New Roman" panose="02020603050405020304" pitchFamily="18" charset="0"/>
+                <a:cs typeface="Times New Roman" panose="02020603050405020304" pitchFamily="18" charset="0"/>
+              </a:rPr>
+              <a:t>PLATO</a:t>
+            </a:r>
+            <a:endParaRPr lang="sr-Latn-RS" dirty="0"/>
+          </a:p>
+        </p:txBody>
+      </p:sp>
+      <p:sp>
+        <p:nvSpPr>
+          <p:cNvPr id="3" name="Content Placeholder 2"/>
+          <p:cNvSpPr>
+            <a:spLocks noGrp="1"/>
+          </p:cNvSpPr>
+          <p:nvPr>
+            <p:ph idx="1"/>
+          </p:nvPr>
+        </p:nvSpPr>
+        <p:spPr/>
+        <p:txBody>
+          <a:bodyPr/>
+          <a:lstStyle/>
+          <a:p>
+            <a:pPr marL="0" indent="0">
+              <a:buNone/>
+            </a:pPr>
+            <a:r>
+              <a:rPr lang="en-US" b="1" u="sng" dirty="0" err="1" smtClean="0">
+                <a:latin typeface="Times New Roman" panose="02020603050405020304" pitchFamily="18" charset="0"/>
+                <a:cs typeface="Times New Roman" panose="02020603050405020304" pitchFamily="18" charset="0"/>
+              </a:rPr>
+              <a:t>Informacije</a:t>
+            </a:r>
+            <a:r>
+              <a:rPr lang="en-US" b="1" u="sng" dirty="0" smtClean="0">
+                <a:latin typeface="Times New Roman" panose="02020603050405020304" pitchFamily="18" charset="0"/>
+                <a:cs typeface="Times New Roman" panose="02020603050405020304" pitchFamily="18" charset="0"/>
+              </a:rPr>
+              <a:t>:</a:t>
+            </a:r>
+          </a:p>
+          <a:p>
+            <a:pPr marL="0" indent="0">
+              <a:buNone/>
+            </a:pPr>
+            <a:endParaRPr lang="en-US" dirty="0"/>
+          </a:p>
+          <a:p>
+            <a:pPr marL="0" indent="0">
+              <a:buNone/>
+            </a:pPr>
+            <a:r>
+              <a:rPr lang="en-US" dirty="0"/>
+              <a:t> </a:t>
+            </a:r>
+            <a:r>
+              <a:rPr lang="en-US" dirty="0" smtClean="0"/>
+              <a:t>    </a:t>
+            </a:r>
+            <a:r>
+              <a:rPr lang="sr-Latn-RS" sz="2800" dirty="0" smtClean="0">
+                <a:latin typeface="Times New Roman" panose="02020603050405020304" pitchFamily="18" charset="0"/>
+                <a:cs typeface="Times New Roman" panose="02020603050405020304" pitchFamily="18" charset="0"/>
+              </a:rPr>
+              <a:t>https</a:t>
+            </a:r>
+            <a:r>
+              <a:rPr lang="sr-Latn-RS" sz="2800" dirty="0">
+                <a:latin typeface="Times New Roman" panose="02020603050405020304" pitchFamily="18" charset="0"/>
+                <a:cs typeface="Times New Roman" panose="02020603050405020304" pitchFamily="18" charset="0"/>
+              </a:rPr>
+              <a:t>://github.com/DejanUrosevic/SoftProjekat.git</a:t>
+            </a:r>
+          </a:p>
+        </p:txBody>
+      </p:sp>
+      <p:sp>
+        <p:nvSpPr>
+          <p:cNvPr id="4" name="Slide Number Placeholder 3"/>
+          <p:cNvSpPr>
+            <a:spLocks noGrp="1"/>
+          </p:cNvSpPr>
+          <p:nvPr>
+            <p:ph type="sldNum" sz="quarter" idx="12"/>
+          </p:nvPr>
+        </p:nvSpPr>
+        <p:spPr/>
+        <p:txBody>
+          <a:bodyPr/>
+          <a:lstStyle/>
+          <a:p>
+            <a:fld id="{136482DD-122F-45A2-B630-FA3C16873A18}" type="slidenum">
+              <a:rPr lang="sr-Latn-RS" smtClean="0"/>
+              <a:t>12</a:t>
             </a:fld>
             <a:endParaRPr lang="sr-Latn-RS"/>
           </a:p>
@@ -7762,7 +8018,7 @@
           <a:lstStyle/>
           <a:p>
             <a:r>
-              <a:rPr lang="sr-Latn-RS" b="1" dirty="0" smtClean="0">
+              <a:rPr lang="sr-Latn-RS" b="1" dirty="0">
                 <a:solidFill>
                   <a:srgbClr val="C00000"/>
                 </a:solidFill>
@@ -7785,22 +8041,34 @@
             <p:ph idx="1"/>
           </p:nvPr>
         </p:nvSpPr>
-        <p:spPr>
-          <a:xfrm>
-            <a:off x="446856" y="1628800"/>
-            <a:ext cx="8229600" cy="4525963"/>
-          </a:xfrm>
-        </p:spPr>
-        <p:txBody>
-          <a:bodyPr>
-            <a:noAutofit/>
-          </a:bodyPr>
+        <p:spPr/>
+        <p:txBody>
+          <a:bodyPr/>
           <a:lstStyle/>
           <a:p>
             <a:pPr marL="0" indent="0">
               <a:buNone/>
             </a:pPr>
-            <a:endParaRPr lang="sr-Latn-RS" sz="2200" dirty="0" smtClean="0">
+            <a:r>
+              <a:rPr lang="en-US" sz="2800" b="1" u="sng" dirty="0" err="1" smtClean="0">
+                <a:latin typeface="Times New Roman" panose="02020603050405020304" pitchFamily="18" charset="0"/>
+                <a:cs typeface="Times New Roman" panose="02020603050405020304" pitchFamily="18" charset="0"/>
+              </a:rPr>
+              <a:t>DataSet</a:t>
+            </a:r>
+            <a:r>
+              <a:rPr lang="en-US" sz="2800" b="1" u="sng" dirty="0" smtClean="0">
+                <a:latin typeface="Times New Roman" panose="02020603050405020304" pitchFamily="18" charset="0"/>
+                <a:cs typeface="Times New Roman" panose="02020603050405020304" pitchFamily="18" charset="0"/>
+              </a:rPr>
+              <a:t>:</a:t>
+            </a:r>
+          </a:p>
+          <a:p>
+            <a:pPr marL="0" indent="0">
+              <a:buNone/>
+            </a:pPr>
+            <a:endParaRPr lang="en-US" sz="2800" b="1" u="sng" dirty="0">
               <a:latin typeface="Times New Roman" panose="02020603050405020304" pitchFamily="18" charset="0"/>
               <a:cs typeface="Times New Roman" panose="02020603050405020304" pitchFamily="18" charset="0"/>
             </a:endParaRPr>
@@ -7810,16 +8078,43 @@
               <a:buNone/>
             </a:pPr>
             <a:r>
-              <a:rPr lang="sr-Latn-RS" sz="2200" dirty="0">
+              <a:rPr lang="en-US" sz="1800" dirty="0" smtClean="0">
                 <a:latin typeface="Times New Roman" panose="02020603050405020304" pitchFamily="18" charset="0"/>
                 <a:cs typeface="Times New Roman" panose="02020603050405020304" pitchFamily="18" charset="0"/>
               </a:rPr>
               <a:t>	</a:t>
             </a:r>
-            <a:endParaRPr lang="sr-Latn-RS" sz="2200" dirty="0" smtClean="0">
+            <a:r>
+              <a:rPr lang="en-US" sz="1800" dirty="0" err="1" smtClean="0">
+                <a:latin typeface="Times New Roman" panose="02020603050405020304" pitchFamily="18" charset="0"/>
+                <a:cs typeface="Times New Roman" panose="02020603050405020304" pitchFamily="18" charset="0"/>
+              </a:rPr>
+              <a:t>Za</a:t>
+            </a:r>
+            <a:r>
+              <a:rPr lang="en-US" sz="1800" dirty="0" smtClean="0">
+                <a:latin typeface="Times New Roman" panose="02020603050405020304" pitchFamily="18" charset="0"/>
+                <a:cs typeface="Times New Roman" panose="02020603050405020304" pitchFamily="18" charset="0"/>
+              </a:rPr>
+              <a:t> </a:t>
+            </a:r>
+            <a:r>
+              <a:rPr lang="sr-Latn-RS" sz="1800" dirty="0" smtClean="0">
+                <a:latin typeface="Times New Roman" panose="02020603050405020304" pitchFamily="18" charset="0"/>
+                <a:cs typeface="Times New Roman" panose="02020603050405020304" pitchFamily="18" charset="0"/>
+              </a:rPr>
+              <a:t>obučavanje neuronske mreže koristiće se alfabet specifičnog fonta koji je propisan zakonom za ispis tablica. 											</a:t>
+            </a:r>
+            <a:endParaRPr lang="sr-Latn-RS" sz="1800" dirty="0">
               <a:latin typeface="Times New Roman" panose="02020603050405020304" pitchFamily="18" charset="0"/>
               <a:cs typeface="Times New Roman" panose="02020603050405020304" pitchFamily="18" charset="0"/>
             </a:endParaRPr>
+          </a:p>
+          <a:p>
+            <a:pPr marL="0" indent="0">
+              <a:buNone/>
+            </a:pPr>
+            <a:endParaRPr lang="sr-Latn-RS" dirty="0"/>
           </a:p>
         </p:txBody>
       </p:sp>
@@ -7881,9 +8176,39 @@
           </a:p>
         </p:txBody>
       </p:sp>
+      <p:sp>
+        <p:nvSpPr>
+          <p:cNvPr id="7" name="TextBox 6"/>
+          <p:cNvSpPr txBox="1"/>
+          <p:nvPr/>
+        </p:nvSpPr>
+        <p:spPr>
+          <a:xfrm>
+            <a:off x="755576" y="4365104"/>
+            <a:ext cx="7848872" cy="369332"/>
+          </a:xfrm>
+          <a:prstGeom prst="rect">
+            <a:avLst/>
+          </a:prstGeom>
+          <a:noFill/>
+        </p:spPr>
+        <p:txBody>
+          <a:bodyPr wrap="square" rtlCol="0">
+            <a:spAutoFit/>
+          </a:bodyPr>
+          <a:lstStyle/>
+          <a:p>
+            <a:r>
+              <a:rPr lang="sr-Latn-RS" dirty="0" smtClean="0"/>
+              <a:t>		</a:t>
+            </a:r>
+            <a:endParaRPr lang="sr-Latn-RS" dirty="0"/>
+          </a:p>
+        </p:txBody>
+      </p:sp>
       <p:pic>
         <p:nvPicPr>
-          <p:cNvPr id="6" name="Picture 5"/>
+          <p:cNvPr id="8" name="Picture 7"/>
           <p:cNvPicPr>
             <a:picLocks noChangeAspect="1"/>
           </p:cNvPicPr>
@@ -7903,8 +8228,8 @@
         </p:blipFill>
         <p:spPr>
           <a:xfrm>
-            <a:off x="3059832" y="1447628"/>
-            <a:ext cx="2907800" cy="2907800"/>
+            <a:off x="467544" y="3402875"/>
+            <a:ext cx="8676456" cy="2663121"/>
           </a:xfrm>
           <a:prstGeom prst="rect">
             <a:avLst/>
@@ -7913,14 +8238,14 @@
       </p:pic>
       <p:sp>
         <p:nvSpPr>
-          <p:cNvPr id="7" name="TextBox 6"/>
+          <p:cNvPr id="9" name="TextBox 8"/>
           <p:cNvSpPr txBox="1"/>
           <p:nvPr/>
         </p:nvSpPr>
         <p:spPr>
           <a:xfrm>
-            <a:off x="465865" y="4507754"/>
-            <a:ext cx="8208912" cy="369332"/>
+            <a:off x="3059832" y="3995772"/>
+            <a:ext cx="3888432" cy="369332"/>
           </a:xfrm>
           <a:prstGeom prst="rect">
             <a:avLst/>
@@ -7933,20 +8258,12 @@
           </a:bodyPr>
           <a:lstStyle/>
           <a:p>
-            <a:pPr algn="ctr"/>
-            <a:r>
-              <a:rPr lang="sr-Latn-RS" dirty="0">
-                <a:latin typeface="Times New Roman" panose="02020603050405020304" pitchFamily="18" charset="0"/>
-                <a:cs typeface="Times New Roman" panose="02020603050405020304" pitchFamily="18" charset="0"/>
-              </a:rPr>
-              <a:t> </a:t>
-            </a:r>
             <a:r>
               <a:rPr lang="sr-Latn-RS" dirty="0" smtClean="0">
                 <a:latin typeface="Times New Roman" panose="02020603050405020304" pitchFamily="18" charset="0"/>
                 <a:cs typeface="Times New Roman" panose="02020603050405020304" pitchFamily="18" charset="0"/>
               </a:rPr>
-              <a:t>     Primer toka obrade slike i obuhvatanje samo bitnih podataka.</a:t>
+              <a:t>Izgled obučavajućeg skupa</a:t>
             </a:r>
             <a:endParaRPr lang="sr-Latn-RS" dirty="0"/>
           </a:p>
@@ -7955,7 +8272,7 @@
     </p:spTree>
     <p:extLst>
       <p:ext uri="{BB962C8B-B14F-4D97-AF65-F5344CB8AC3E}">
-        <p14:creationId xmlns:p14="http://schemas.microsoft.com/office/powerpoint/2010/main" val="4103685092"/>
+        <p14:creationId xmlns:p14="http://schemas.microsoft.com/office/powerpoint/2010/main" val="3557924430"/>
       </p:ext>
     </p:extLst>
   </p:cSld>
@@ -7974,13 +8291,6 @@
       </p:transition>
     </mc:Fallback>
   </mc:AlternateContent>
-  <p:timing>
-    <p:tnLst>
-      <p:par>
-        <p:cTn id="1" dur="indefinite" restart="never" nodeType="tmRoot"/>
-      </p:par>
-    </p:tnLst>
-  </p:timing>
 </p:sld>
 </file>
 

</xml_diff>